<commit_message>
oop/inheritance: refine snakes and ladders diagram
</commit_message>
<xml_diff>
--- a/diagrams/oop/inheritance/what/boardSquare.pptx
+++ b/diagrams/oop/inheritance/what/boardSquare.pptx
@@ -304,7 +304,7 @@
           <a:p>
             <a:fld id="{6E9429AC-5462-4B40-8447-F983F8AC2DA9}" type="datetimeFigureOut">
               <a:rPr lang="en-SG" smtClean="0"/>
-              <a:t>4/9/2017</a:t>
+              <a:t>10/9/2017</a:t>
             </a:fld>
             <a:endParaRPr lang="en-SG"/>
           </a:p>
@@ -474,7 +474,7 @@
           <a:p>
             <a:fld id="{6E9429AC-5462-4B40-8447-F983F8AC2DA9}" type="datetimeFigureOut">
               <a:rPr lang="en-SG" smtClean="0"/>
-              <a:t>4/9/2017</a:t>
+              <a:t>10/9/2017</a:t>
             </a:fld>
             <a:endParaRPr lang="en-SG"/>
           </a:p>
@@ -654,7 +654,7 @@
           <a:p>
             <a:fld id="{6E9429AC-5462-4B40-8447-F983F8AC2DA9}" type="datetimeFigureOut">
               <a:rPr lang="en-SG" smtClean="0"/>
-              <a:t>4/9/2017</a:t>
+              <a:t>10/9/2017</a:t>
             </a:fld>
             <a:endParaRPr lang="en-SG"/>
           </a:p>
@@ -824,7 +824,7 @@
           <a:p>
             <a:fld id="{6E9429AC-5462-4B40-8447-F983F8AC2DA9}" type="datetimeFigureOut">
               <a:rPr lang="en-SG" smtClean="0"/>
-              <a:t>4/9/2017</a:t>
+              <a:t>10/9/2017</a:t>
             </a:fld>
             <a:endParaRPr lang="en-SG"/>
           </a:p>
@@ -1070,7 +1070,7 @@
           <a:p>
             <a:fld id="{6E9429AC-5462-4B40-8447-F983F8AC2DA9}" type="datetimeFigureOut">
               <a:rPr lang="en-SG" smtClean="0"/>
-              <a:t>4/9/2017</a:t>
+              <a:t>10/9/2017</a:t>
             </a:fld>
             <a:endParaRPr lang="en-SG"/>
           </a:p>
@@ -1358,7 +1358,7 @@
           <a:p>
             <a:fld id="{6E9429AC-5462-4B40-8447-F983F8AC2DA9}" type="datetimeFigureOut">
               <a:rPr lang="en-SG" smtClean="0"/>
-              <a:t>4/9/2017</a:t>
+              <a:t>10/9/2017</a:t>
             </a:fld>
             <a:endParaRPr lang="en-SG"/>
           </a:p>
@@ -1780,7 +1780,7 @@
           <a:p>
             <a:fld id="{6E9429AC-5462-4B40-8447-F983F8AC2DA9}" type="datetimeFigureOut">
               <a:rPr lang="en-SG" smtClean="0"/>
-              <a:t>4/9/2017</a:t>
+              <a:t>10/9/2017</a:t>
             </a:fld>
             <a:endParaRPr lang="en-SG"/>
           </a:p>
@@ -1898,7 +1898,7 @@
           <a:p>
             <a:fld id="{6E9429AC-5462-4B40-8447-F983F8AC2DA9}" type="datetimeFigureOut">
               <a:rPr lang="en-SG" smtClean="0"/>
-              <a:t>4/9/2017</a:t>
+              <a:t>10/9/2017</a:t>
             </a:fld>
             <a:endParaRPr lang="en-SG"/>
           </a:p>
@@ -1993,7 +1993,7 @@
           <a:p>
             <a:fld id="{6E9429AC-5462-4B40-8447-F983F8AC2DA9}" type="datetimeFigureOut">
               <a:rPr lang="en-SG" smtClean="0"/>
-              <a:t>4/9/2017</a:t>
+              <a:t>10/9/2017</a:t>
             </a:fld>
             <a:endParaRPr lang="en-SG"/>
           </a:p>
@@ -2270,7 +2270,7 @@
           <a:p>
             <a:fld id="{6E9429AC-5462-4B40-8447-F983F8AC2DA9}" type="datetimeFigureOut">
               <a:rPr lang="en-SG" smtClean="0"/>
-              <a:t>4/9/2017</a:t>
+              <a:t>10/9/2017</a:t>
             </a:fld>
             <a:endParaRPr lang="en-SG"/>
           </a:p>
@@ -2523,7 +2523,7 @@
           <a:p>
             <a:fld id="{6E9429AC-5462-4B40-8447-F983F8AC2DA9}" type="datetimeFigureOut">
               <a:rPr lang="en-SG" smtClean="0"/>
-              <a:t>4/9/2017</a:t>
+              <a:t>10/9/2017</a:t>
             </a:fld>
             <a:endParaRPr lang="en-SG"/>
           </a:p>
@@ -2736,7 +2736,7 @@
           <a:p>
             <a:fld id="{6E9429AC-5462-4B40-8447-F983F8AC2DA9}" type="datetimeFigureOut">
               <a:rPr lang="en-SG" smtClean="0"/>
-              <a:t>4/9/2017</a:t>
+              <a:t>10/9/2017</a:t>
             </a:fld>
             <a:endParaRPr lang="en-SG"/>
           </a:p>
@@ -3442,8 +3442,8 @@
         </p:nvSpPr>
         <p:spPr>
           <a:xfrm>
-            <a:off x="2286000" y="3200400"/>
-            <a:ext cx="990600" cy="646331"/>
+            <a:off x="2735238" y="3506569"/>
+            <a:ext cx="576808" cy="369332"/>
           </a:xfrm>
           <a:prstGeom prst="rect">
             <a:avLst/>
@@ -3483,40 +3483,9 @@
                 <a:uFillTx/>
                 <a:latin typeface="Calibri" pitchFamily="34" charset="0"/>
               </a:rPr>
-              <a:t>        100</a:t>
-            </a:r>
-          </a:p>
-          <a:p>
-            <a:pPr marL="0" marR="0" lvl="0" indent="0" defTabSz="914400" eaLnBrk="1" fontAlgn="auto" latinLnBrk="0" hangingPunct="1">
-              <a:lnSpc>
-                <a:spcPct val="100000"/>
-              </a:lnSpc>
-              <a:spcBef>
-                <a:spcPts val="0"/>
-              </a:spcBef>
-              <a:spcAft>
-                <a:spcPts val="0"/>
-              </a:spcAft>
-              <a:buClrTx/>
-              <a:buSzTx/>
-              <a:buFontTx/>
-              <a:buNone/>
-              <a:tabLst/>
-              <a:defRPr/>
-            </a:pPr>
-            <a:r>
-              <a:rPr kumimoji="0" lang="en-US" sz="1800" b="0" i="0" u="none" strike="noStrike" kern="0" cap="none" spc="0" normalizeH="0" baseline="0" noProof="0" dirty="0" smtClean="0">
-                <a:ln>
-                  <a:noFill/>
-                </a:ln>
-                <a:effectLst/>
-                <a:uLnTx/>
-                <a:uFillTx/>
-                <a:latin typeface="Calibri" pitchFamily="34" charset="0"/>
-              </a:rPr>
-              <a:t>has</a:t>
-            </a:r>
-            <a:endParaRPr kumimoji="0" lang="en-US" sz="1800" b="1" i="0" u="none" strike="noStrike" kern="0" cap="none" spc="0" normalizeH="0" baseline="0" noProof="0" dirty="0">
+              <a:t>100</a:t>
+            </a:r>
+            <a:endParaRPr kumimoji="0" lang="en-US" sz="1800" b="0" i="0" u="none" strike="noStrike" kern="0" cap="none" spc="0" normalizeH="0" baseline="0" noProof="0" dirty="0" smtClean="0">
               <a:ln>
                 <a:noFill/>
               </a:ln>
@@ -3664,69 +3633,6 @@
           </a:fontRef>
         </p:style>
       </p:cxnSp>
-      <p:sp>
-        <p:nvSpPr>
-          <p:cNvPr id="56" name="TextBox 55"/>
-          <p:cNvSpPr txBox="1"/>
-          <p:nvPr/>
-        </p:nvSpPr>
-        <p:spPr>
-          <a:xfrm>
-            <a:off x="1752600" y="5879068"/>
-            <a:ext cx="1219200" cy="369332"/>
-          </a:xfrm>
-          <a:prstGeom prst="rect">
-            <a:avLst/>
-          </a:prstGeom>
-          <a:noFill/>
-        </p:spPr>
-        <p:txBody>
-          <a:bodyPr wrap="square" rtlCol="0">
-            <a:spAutoFit/>
-          </a:bodyPr>
-          <a:lstStyle/>
-          <a:p>
-            <a:pPr marL="0" marR="0" lvl="0" indent="0" defTabSz="914400" eaLnBrk="1" fontAlgn="auto" latinLnBrk="0" hangingPunct="1">
-              <a:lnSpc>
-                <a:spcPct val="100000"/>
-              </a:lnSpc>
-              <a:spcBef>
-                <a:spcPts val="0"/>
-              </a:spcBef>
-              <a:spcAft>
-                <a:spcPts val="0"/>
-              </a:spcAft>
-              <a:buClrTx/>
-              <a:buSzTx/>
-              <a:buFontTx/>
-              <a:buNone/>
-              <a:tabLst/>
-              <a:defRPr/>
-            </a:pPr>
-            <a:r>
-              <a:rPr kumimoji="0" lang="en-US" sz="1800" b="0" i="0" u="none" strike="noStrike" kern="0" cap="none" spc="0" normalizeH="0" baseline="0" noProof="0" dirty="0" smtClean="0">
-                <a:ln>
-                  <a:noFill/>
-                </a:ln>
-                <a:effectLst/>
-                <a:uLnTx/>
-                <a:uFillTx/>
-                <a:latin typeface="Calibri" pitchFamily="34" charset="0"/>
-              </a:rPr>
-              <a:t>  head in</a:t>
-            </a:r>
-            <a:endParaRPr kumimoji="0" lang="en-US" sz="1800" b="0" i="0" u="none" strike="noStrike" kern="0" cap="none" spc="0" normalizeH="0" baseline="0" noProof="0" dirty="0">
-              <a:ln>
-                <a:noFill/>
-              </a:ln>
-              <a:effectLst/>
-              <a:uLnTx/>
-              <a:uFillTx/>
-              <a:latin typeface="Calibri" pitchFamily="34" charset="0"/>
-            </a:endParaRPr>
-          </a:p>
-        </p:txBody>
-      </p:sp>
       <p:cxnSp>
         <p:nvCxnSpPr>
           <p:cNvPr id="57" name="Shape 52"/>
@@ -3765,69 +3671,6 @@
           </a:fontRef>
         </p:style>
       </p:cxnSp>
-      <p:sp>
-        <p:nvSpPr>
-          <p:cNvPr id="58" name="TextBox 57"/>
-          <p:cNvSpPr txBox="1"/>
-          <p:nvPr/>
-        </p:nvSpPr>
-        <p:spPr>
-          <a:xfrm>
-            <a:off x="3962400" y="5486400"/>
-            <a:ext cx="1219200" cy="369332"/>
-          </a:xfrm>
-          <a:prstGeom prst="rect">
-            <a:avLst/>
-          </a:prstGeom>
-          <a:noFill/>
-        </p:spPr>
-        <p:txBody>
-          <a:bodyPr wrap="square" rtlCol="0">
-            <a:spAutoFit/>
-          </a:bodyPr>
-          <a:lstStyle/>
-          <a:p>
-            <a:pPr marL="0" marR="0" lvl="0" indent="0" defTabSz="914400" eaLnBrk="1" fontAlgn="auto" latinLnBrk="0" hangingPunct="1">
-              <a:lnSpc>
-                <a:spcPct val="100000"/>
-              </a:lnSpc>
-              <a:spcBef>
-                <a:spcPts val="0"/>
-              </a:spcBef>
-              <a:spcAft>
-                <a:spcPts val="0"/>
-              </a:spcAft>
-              <a:buClrTx/>
-              <a:buSzTx/>
-              <a:buFontTx/>
-              <a:buNone/>
-              <a:tabLst/>
-              <a:defRPr/>
-            </a:pPr>
-            <a:r>
-              <a:rPr kumimoji="0" lang="en-US" sz="1800" b="0" i="0" u="none" strike="noStrike" kern="0" cap="none" spc="0" normalizeH="0" baseline="0" noProof="0" dirty="0" smtClean="0">
-                <a:ln>
-                  <a:noFill/>
-                </a:ln>
-                <a:effectLst/>
-                <a:uLnTx/>
-                <a:uFillTx/>
-                <a:latin typeface="Calibri" pitchFamily="34" charset="0"/>
-              </a:rPr>
-              <a:t> tail in </a:t>
-            </a:r>
-            <a:endParaRPr kumimoji="0" lang="en-US" sz="1800" b="0" i="0" u="none" strike="noStrike" kern="0" cap="none" spc="0" normalizeH="0" baseline="0" noProof="0" dirty="0">
-              <a:ln>
-                <a:noFill/>
-              </a:ln>
-              <a:effectLst/>
-              <a:uLnTx/>
-              <a:uFillTx/>
-              <a:latin typeface="Calibri" pitchFamily="34" charset="0"/>
-            </a:endParaRPr>
-          </a:p>
-        </p:txBody>
-      </p:sp>
       <p:cxnSp>
         <p:nvCxnSpPr>
           <p:cNvPr id="59" name="Shape 52"/>
@@ -4044,59 +3887,8 @@
                 <a:uFillTx/>
                 <a:latin typeface="Calibri" pitchFamily="34" charset="0"/>
               </a:rPr>
-              <a:t> 5</a:t>
-            </a:r>
-            <a:endParaRPr kumimoji="0" lang="en-US" sz="1800" b="0" i="0" u="none" strike="noStrike" kern="0" cap="none" spc="0" normalizeH="0" baseline="0" noProof="0" dirty="0">
-              <a:ln>
-                <a:noFill/>
-              </a:ln>
-              <a:effectLst/>
-              <a:uLnTx/>
-              <a:uFillTx/>
-              <a:latin typeface="Calibri" pitchFamily="34" charset="0"/>
-            </a:endParaRPr>
-          </a:p>
-        </p:txBody>
-      </p:sp>
-      <p:sp>
-        <p:nvSpPr>
-          <p:cNvPr id="63" name="TextBox 62"/>
-          <p:cNvSpPr txBox="1"/>
-          <p:nvPr/>
-        </p:nvSpPr>
-        <p:spPr>
-          <a:xfrm>
-            <a:off x="990600" y="6248400"/>
-            <a:ext cx="1066800" cy="369332"/>
-          </a:xfrm>
-          <a:prstGeom prst="rect">
-            <a:avLst/>
-          </a:prstGeom>
-          <a:noFill/>
-        </p:spPr>
-        <p:txBody>
-          <a:bodyPr wrap="square" rtlCol="0">
-            <a:spAutoFit/>
-          </a:bodyPr>
-          <a:lstStyle/>
-          <a:p>
-            <a:pPr marL="0" marR="0" lvl="0" indent="0" defTabSz="914400" eaLnBrk="1" fontAlgn="auto" latinLnBrk="0" hangingPunct="1">
-              <a:lnSpc>
-                <a:spcPct val="100000"/>
-              </a:lnSpc>
-              <a:spcBef>
-                <a:spcPts val="0"/>
-              </a:spcBef>
-              <a:spcAft>
-                <a:spcPts val="0"/>
-              </a:spcAft>
-              <a:buClrTx/>
-              <a:buSzTx/>
-              <a:buFontTx/>
-              <a:buNone/>
-              <a:tabLst/>
-              <a:defRPr/>
-            </a:pPr>
+              <a:t> </a:t>
+            </a:r>
             <a:r>
               <a:rPr kumimoji="0" lang="en-US" sz="1800" b="0" i="0" u="none" strike="noStrike" kern="0" cap="none" spc="0" normalizeH="0" baseline="0" noProof="0" dirty="0" smtClean="0">
                 <a:ln>
@@ -4107,9 +3899,9 @@
                 <a:uFillTx/>
                 <a:latin typeface="Calibri" pitchFamily="34" charset="0"/>
               </a:rPr>
-              <a:t>has </a:t>
-            </a:r>
-            <a:endParaRPr kumimoji="0" lang="en-US" sz="1800" b="1" i="0" u="none" strike="noStrike" kern="0" cap="none" spc="0" normalizeH="0" baseline="0" noProof="0" dirty="0">
+              <a:t>6</a:t>
+            </a:r>
+            <a:endParaRPr kumimoji="0" lang="en-US" sz="1800" b="0" i="0" u="none" strike="noStrike" kern="0" cap="none" spc="0" normalizeH="0" baseline="0" noProof="0" dirty="0">
               <a:ln>
                 <a:noFill/>
               </a:ln>
@@ -4572,6 +4364,284 @@
               <a:uFillTx/>
               <a:latin typeface="Calibri" pitchFamily="34" charset="0"/>
             </a:endParaRPr>
+          </a:p>
+        </p:txBody>
+      </p:sp>
+      <p:grpSp>
+        <p:nvGrpSpPr>
+          <p:cNvPr id="4" name="Group 3"/>
+          <p:cNvGrpSpPr/>
+          <p:nvPr/>
+        </p:nvGrpSpPr>
+        <p:grpSpPr>
+          <a:xfrm>
+            <a:off x="1941751" y="3217002"/>
+            <a:ext cx="612297" cy="369332"/>
+            <a:chOff x="664045" y="688050"/>
+            <a:chExt cx="612297" cy="369332"/>
+          </a:xfrm>
+        </p:grpSpPr>
+        <p:sp>
+          <p:nvSpPr>
+            <p:cNvPr id="2" name="Isosceles Triangle 1"/>
+            <p:cNvSpPr/>
+            <p:nvPr/>
+          </p:nvSpPr>
+          <p:spPr>
+            <a:xfrm rot="5400000">
+              <a:off x="1159845" y="820003"/>
+              <a:ext cx="127567" cy="105427"/>
+            </a:xfrm>
+            <a:prstGeom prst="triangle">
+              <a:avLst/>
+            </a:prstGeom>
+            <a:solidFill>
+              <a:schemeClr val="tx1"/>
+            </a:solidFill>
+            <a:ln>
+              <a:noFill/>
+            </a:ln>
+          </p:spPr>
+          <p:style>
+            <a:lnRef idx="2">
+              <a:schemeClr val="accent1">
+                <a:shade val="50000"/>
+              </a:schemeClr>
+            </a:lnRef>
+            <a:fillRef idx="1">
+              <a:schemeClr val="accent1"/>
+            </a:fillRef>
+            <a:effectRef idx="0">
+              <a:schemeClr val="accent1"/>
+            </a:effectRef>
+            <a:fontRef idx="minor">
+              <a:schemeClr val="lt1"/>
+            </a:fontRef>
+          </p:style>
+          <p:txBody>
+            <a:bodyPr rtlCol="0" anchor="ctr"/>
+            <a:lstStyle/>
+            <a:p>
+              <a:pPr algn="ctr"/>
+              <a:endParaRPr lang="en-US"/>
+            </a:p>
+          </p:txBody>
+        </p:sp>
+        <p:sp>
+          <p:nvSpPr>
+            <p:cNvPr id="3" name="Rectangle 2"/>
+            <p:cNvSpPr/>
+            <p:nvPr/>
+          </p:nvSpPr>
+          <p:spPr>
+            <a:xfrm>
+              <a:off x="664045" y="688050"/>
+              <a:ext cx="506870" cy="369332"/>
+            </a:xfrm>
+            <a:prstGeom prst="rect">
+              <a:avLst/>
+            </a:prstGeom>
+          </p:spPr>
+          <p:txBody>
+            <a:bodyPr wrap="none">
+              <a:spAutoFit/>
+            </a:bodyPr>
+            <a:lstStyle/>
+            <a:p>
+              <a:pPr lvl="0">
+                <a:defRPr/>
+              </a:pPr>
+              <a:r>
+                <a:rPr lang="en-US" kern="0" dirty="0">
+                  <a:latin typeface="Calibri" pitchFamily="34" charset="0"/>
+                </a:rPr>
+                <a:t>has</a:t>
+              </a:r>
+              <a:endParaRPr lang="en-US" b="1" kern="0" dirty="0">
+                <a:latin typeface="Calibri" pitchFamily="34" charset="0"/>
+              </a:endParaRPr>
+            </a:p>
+          </p:txBody>
+        </p:sp>
+      </p:grpSp>
+      <p:grpSp>
+        <p:nvGrpSpPr>
+          <p:cNvPr id="27" name="Group 26"/>
+          <p:cNvGrpSpPr/>
+          <p:nvPr/>
+        </p:nvGrpSpPr>
+        <p:grpSpPr>
+          <a:xfrm>
+            <a:off x="457269" y="5930563"/>
+            <a:ext cx="612297" cy="369332"/>
+            <a:chOff x="664045" y="688050"/>
+            <a:chExt cx="612297" cy="369332"/>
+          </a:xfrm>
+        </p:grpSpPr>
+        <p:sp>
+          <p:nvSpPr>
+            <p:cNvPr id="28" name="Isosceles Triangle 27"/>
+            <p:cNvSpPr/>
+            <p:nvPr/>
+          </p:nvSpPr>
+          <p:spPr>
+            <a:xfrm rot="5400000">
+              <a:off x="1159845" y="820003"/>
+              <a:ext cx="127567" cy="105427"/>
+            </a:xfrm>
+            <a:prstGeom prst="triangle">
+              <a:avLst/>
+            </a:prstGeom>
+            <a:solidFill>
+              <a:schemeClr val="tx1"/>
+            </a:solidFill>
+            <a:ln>
+              <a:noFill/>
+            </a:ln>
+          </p:spPr>
+          <p:style>
+            <a:lnRef idx="2">
+              <a:schemeClr val="accent1">
+                <a:shade val="50000"/>
+              </a:schemeClr>
+            </a:lnRef>
+            <a:fillRef idx="1">
+              <a:schemeClr val="accent1"/>
+            </a:fillRef>
+            <a:effectRef idx="0">
+              <a:schemeClr val="accent1"/>
+            </a:effectRef>
+            <a:fontRef idx="minor">
+              <a:schemeClr val="lt1"/>
+            </a:fontRef>
+          </p:style>
+          <p:txBody>
+            <a:bodyPr rtlCol="0" anchor="ctr"/>
+            <a:lstStyle/>
+            <a:p>
+              <a:pPr algn="ctr"/>
+              <a:endParaRPr lang="en-US"/>
+            </a:p>
+          </p:txBody>
+        </p:sp>
+        <p:sp>
+          <p:nvSpPr>
+            <p:cNvPr id="29" name="Rectangle 28"/>
+            <p:cNvSpPr/>
+            <p:nvPr/>
+          </p:nvSpPr>
+          <p:spPr>
+            <a:xfrm>
+              <a:off x="664045" y="688050"/>
+              <a:ext cx="506870" cy="369332"/>
+            </a:xfrm>
+            <a:prstGeom prst="rect">
+              <a:avLst/>
+            </a:prstGeom>
+          </p:spPr>
+          <p:txBody>
+            <a:bodyPr wrap="none">
+              <a:spAutoFit/>
+            </a:bodyPr>
+            <a:lstStyle/>
+            <a:p>
+              <a:pPr lvl="0">
+                <a:defRPr/>
+              </a:pPr>
+              <a:r>
+                <a:rPr lang="en-US" kern="0" dirty="0">
+                  <a:latin typeface="Calibri" pitchFamily="34" charset="0"/>
+                </a:rPr>
+                <a:t>has</a:t>
+              </a:r>
+              <a:endParaRPr lang="en-US" b="1" kern="0" dirty="0">
+                <a:latin typeface="Calibri" pitchFamily="34" charset="0"/>
+              </a:endParaRPr>
+            </a:p>
+          </p:txBody>
+        </p:sp>
+      </p:grpSp>
+      <p:pic>
+        <p:nvPicPr>
+          <p:cNvPr id="1026" name="Picture 2" descr="Image result for snakes and ladders"/>
+          <p:cNvPicPr>
+            <a:picLocks noChangeAspect="1" noChangeArrowheads="1"/>
+          </p:cNvPicPr>
+          <p:nvPr/>
+        </p:nvPicPr>
+        <p:blipFill rotWithShape="1">
+          <a:blip r:embed="rId2">
+            <a:extLst>
+              <a:ext uri="{28A0092B-C50C-407E-A947-70E740481C1C}">
+                <a14:useLocalDpi xmlns:a14="http://schemas.microsoft.com/office/drawing/2010/main" val="0"/>
+              </a:ext>
+            </a:extLst>
+          </a:blip>
+          <a:srcRect r="40693" b="10986"/>
+          <a:stretch/>
+        </p:blipFill>
+        <p:spPr bwMode="auto">
+          <a:xfrm>
+            <a:off x="6705600" y="3093062"/>
+            <a:ext cx="3202436" cy="3168353"/>
+          </a:xfrm>
+          <a:prstGeom prst="rect">
+            <a:avLst/>
+          </a:prstGeom>
+          <a:noFill/>
+          <a:extLst>
+            <a:ext uri="{909E8E84-426E-40DD-AFC4-6F175D3DCCD1}">
+              <a14:hiddenFill xmlns:a14="http://schemas.microsoft.com/office/drawing/2010/main">
+                <a:solidFill>
+                  <a:srgbClr val="FFFFFF"/>
+                </a:solidFill>
+              </a14:hiddenFill>
+            </a:ext>
+          </a:extLst>
+        </p:spPr>
+      </p:pic>
+      <p:sp>
+        <p:nvSpPr>
+          <p:cNvPr id="5" name="Rectangle 4"/>
+          <p:cNvSpPr/>
+          <p:nvPr/>
+        </p:nvSpPr>
+        <p:spPr>
+          <a:xfrm>
+            <a:off x="5436097" y="6348167"/>
+            <a:ext cx="4471940" cy="230832"/>
+          </a:xfrm>
+          <a:prstGeom prst="rect">
+            <a:avLst/>
+          </a:prstGeom>
+        </p:spPr>
+        <p:txBody>
+          <a:bodyPr wrap="square">
+            <a:spAutoFit/>
+          </a:bodyPr>
+          <a:lstStyle/>
+          <a:p>
+            <a:pPr algn="r"/>
+            <a:r>
+              <a:rPr lang="en-US" sz="900" dirty="0" smtClean="0">
+                <a:solidFill>
+                  <a:schemeClr val="bg1">
+                    <a:lumMod val="50000"/>
+                  </a:schemeClr>
+                </a:solidFill>
+              </a:rPr>
+              <a:t>Image credit: https</a:t>
+            </a:r>
+            <a:r>
+              <a:rPr lang="en-US" sz="900" dirty="0">
+                <a:solidFill>
+                  <a:schemeClr val="bg1">
+                    <a:lumMod val="50000"/>
+                  </a:schemeClr>
+                </a:solidFill>
+              </a:rPr>
+              <a:t>://www.flickr.com/photos/7819129@N07/4366373472</a:t>
+            </a:r>
           </a:p>
         </p:txBody>
       </p:sp>

</xml_diff>